<commit_message>
add check MS document properties
</commit_message>
<xml_diff>
--- a/test/testFiles/test1.pptx
+++ b/test/testFiles/test1.pptx
@@ -243,7 +243,7 @@
           <a:p>
             <a:fld id="{77613D94-F4BD-4BFE-B0EF-FEF450ABA27F}" type="datetimeFigureOut">
               <a:rPr lang="ru-RU" smtClean="0"/>
-              <a:t>31.05.2016</a:t>
+              <a:t>01.06.2016</a:t>
             </a:fld>
             <a:endParaRPr lang="ru-RU"/>
           </a:p>
@@ -413,7 +413,7 @@
           <a:p>
             <a:fld id="{77613D94-F4BD-4BFE-B0EF-FEF450ABA27F}" type="datetimeFigureOut">
               <a:rPr lang="ru-RU" smtClean="0"/>
-              <a:t>31.05.2016</a:t>
+              <a:t>01.06.2016</a:t>
             </a:fld>
             <a:endParaRPr lang="ru-RU"/>
           </a:p>
@@ -593,7 +593,7 @@
           <a:p>
             <a:fld id="{77613D94-F4BD-4BFE-B0EF-FEF450ABA27F}" type="datetimeFigureOut">
               <a:rPr lang="ru-RU" smtClean="0"/>
-              <a:t>31.05.2016</a:t>
+              <a:t>01.06.2016</a:t>
             </a:fld>
             <a:endParaRPr lang="ru-RU"/>
           </a:p>
@@ -763,7 +763,7 @@
           <a:p>
             <a:fld id="{77613D94-F4BD-4BFE-B0EF-FEF450ABA27F}" type="datetimeFigureOut">
               <a:rPr lang="ru-RU" smtClean="0"/>
-              <a:t>31.05.2016</a:t>
+              <a:t>01.06.2016</a:t>
             </a:fld>
             <a:endParaRPr lang="ru-RU"/>
           </a:p>
@@ -1009,7 +1009,7 @@
           <a:p>
             <a:fld id="{77613D94-F4BD-4BFE-B0EF-FEF450ABA27F}" type="datetimeFigureOut">
               <a:rPr lang="ru-RU" smtClean="0"/>
-              <a:t>31.05.2016</a:t>
+              <a:t>01.06.2016</a:t>
             </a:fld>
             <a:endParaRPr lang="ru-RU"/>
           </a:p>
@@ -1241,7 +1241,7 @@
           <a:p>
             <a:fld id="{77613D94-F4BD-4BFE-B0EF-FEF450ABA27F}" type="datetimeFigureOut">
               <a:rPr lang="ru-RU" smtClean="0"/>
-              <a:t>31.05.2016</a:t>
+              <a:t>01.06.2016</a:t>
             </a:fld>
             <a:endParaRPr lang="ru-RU"/>
           </a:p>
@@ -1608,7 +1608,7 @@
           <a:p>
             <a:fld id="{77613D94-F4BD-4BFE-B0EF-FEF450ABA27F}" type="datetimeFigureOut">
               <a:rPr lang="ru-RU" smtClean="0"/>
-              <a:t>31.05.2016</a:t>
+              <a:t>01.06.2016</a:t>
             </a:fld>
             <a:endParaRPr lang="ru-RU"/>
           </a:p>
@@ -1726,7 +1726,7 @@
           <a:p>
             <a:fld id="{77613D94-F4BD-4BFE-B0EF-FEF450ABA27F}" type="datetimeFigureOut">
               <a:rPr lang="ru-RU" smtClean="0"/>
-              <a:t>31.05.2016</a:t>
+              <a:t>01.06.2016</a:t>
             </a:fld>
             <a:endParaRPr lang="ru-RU"/>
           </a:p>
@@ -1821,7 +1821,7 @@
           <a:p>
             <a:fld id="{77613D94-F4BD-4BFE-B0EF-FEF450ABA27F}" type="datetimeFigureOut">
               <a:rPr lang="ru-RU" smtClean="0"/>
-              <a:t>31.05.2016</a:t>
+              <a:t>01.06.2016</a:t>
             </a:fld>
             <a:endParaRPr lang="ru-RU"/>
           </a:p>
@@ -2098,7 +2098,7 @@
           <a:p>
             <a:fld id="{77613D94-F4BD-4BFE-B0EF-FEF450ABA27F}" type="datetimeFigureOut">
               <a:rPr lang="ru-RU" smtClean="0"/>
-              <a:t>31.05.2016</a:t>
+              <a:t>01.06.2016</a:t>
             </a:fld>
             <a:endParaRPr lang="ru-RU"/>
           </a:p>
@@ -2351,7 +2351,7 @@
           <a:p>
             <a:fld id="{77613D94-F4BD-4BFE-B0EF-FEF450ABA27F}" type="datetimeFigureOut">
               <a:rPr lang="ru-RU" smtClean="0"/>
-              <a:t>31.05.2016</a:t>
+              <a:t>01.06.2016</a:t>
             </a:fld>
             <a:endParaRPr lang="ru-RU"/>
           </a:p>
@@ -2564,7 +2564,7 @@
           <a:p>
             <a:fld id="{77613D94-F4BD-4BFE-B0EF-FEF450ABA27F}" type="datetimeFigureOut">
               <a:rPr lang="ru-RU" smtClean="0"/>
-              <a:t>31.05.2016</a:t>
+              <a:t>01.06.2016</a:t>
             </a:fld>
             <a:endParaRPr lang="ru-RU"/>
           </a:p>

</xml_diff>